<commit_message>
Updated AIAA 2016 paper; all comments are incorporated
</commit_message>
<xml_diff>
--- a/docs/AIAA 2016 highway platooning/fig/vehicleModes.pptx
+++ b/docs/AIAA 2016 highway platooning/fig/vehicleModes.pptx
@@ -154,7 +154,7 @@
           </a:lstStyle>
           <a:p>
             <a:r>
-              <a:rPr lang="en-US" smtClean="0"/>
+              <a:rPr lang="en-US"/>
               <a:t>Click to edit Master title style</a:t>
             </a:r>
             <a:endParaRPr lang="en-US" dirty="0"/>
@@ -219,7 +219,7 @@
           </a:lstStyle>
           <a:p>
             <a:r>
-              <a:rPr lang="en-US" smtClean="0"/>
+              <a:rPr lang="en-US"/>
               <a:t>Click to edit Master subtitle style</a:t>
             </a:r>
             <a:endParaRPr lang="en-US" dirty="0"/>
@@ -243,7 +243,7 @@
           <a:p>
             <a:fld id="{672AD7E1-AA2C-46F3-A94C-00AB04138B09}" type="datetimeFigureOut">
               <a:rPr lang="en-US" smtClean="0"/>
-              <a:t>03/22/15</a:t>
+              <a:t>5/11/2016</a:t>
             </a:fld>
             <a:endParaRPr lang="en-US"/>
           </a:p>
@@ -337,7 +337,7 @@
           <a:lstStyle/>
           <a:p>
             <a:r>
-              <a:rPr lang="en-US" smtClean="0"/>
+              <a:rPr lang="en-US"/>
               <a:t>Click to edit Master title style</a:t>
             </a:r>
             <a:endParaRPr lang="en-US" dirty="0"/>
@@ -361,35 +361,35 @@
           <a:p>
             <a:pPr lvl="0"/>
             <a:r>
-              <a:rPr lang="en-US" smtClean="0"/>
+              <a:rPr lang="en-US"/>
               <a:t>Click to edit Master text styles</a:t>
             </a:r>
           </a:p>
           <a:p>
             <a:pPr lvl="1"/>
             <a:r>
-              <a:rPr lang="en-US" smtClean="0"/>
+              <a:rPr lang="en-US"/>
               <a:t>Second level</a:t>
             </a:r>
           </a:p>
           <a:p>
             <a:pPr lvl="2"/>
             <a:r>
-              <a:rPr lang="en-US" smtClean="0"/>
+              <a:rPr lang="en-US"/>
               <a:t>Third level</a:t>
             </a:r>
           </a:p>
           <a:p>
             <a:pPr lvl="3"/>
             <a:r>
-              <a:rPr lang="en-US" smtClean="0"/>
+              <a:rPr lang="en-US"/>
               <a:t>Fourth level</a:t>
             </a:r>
           </a:p>
           <a:p>
             <a:pPr lvl="4"/>
             <a:r>
-              <a:rPr lang="en-US" smtClean="0"/>
+              <a:rPr lang="en-US"/>
               <a:t>Fifth level</a:t>
             </a:r>
             <a:endParaRPr lang="en-US" dirty="0"/>
@@ -413,7 +413,7 @@
           <a:p>
             <a:fld id="{672AD7E1-AA2C-46F3-A94C-00AB04138B09}" type="datetimeFigureOut">
               <a:rPr lang="en-US" smtClean="0"/>
-              <a:t>03/22/15</a:t>
+              <a:t>5/11/2016</a:t>
             </a:fld>
             <a:endParaRPr lang="en-US"/>
           </a:p>
@@ -512,7 +512,7 @@
           <a:lstStyle/>
           <a:p>
             <a:r>
-              <a:rPr lang="en-US" smtClean="0"/>
+              <a:rPr lang="en-US"/>
               <a:t>Click to edit Master title style</a:t>
             </a:r>
             <a:endParaRPr lang="en-US" dirty="0"/>
@@ -541,35 +541,35 @@
           <a:p>
             <a:pPr lvl="0"/>
             <a:r>
-              <a:rPr lang="en-US" smtClean="0"/>
+              <a:rPr lang="en-US"/>
               <a:t>Click to edit Master text styles</a:t>
             </a:r>
           </a:p>
           <a:p>
             <a:pPr lvl="1"/>
             <a:r>
-              <a:rPr lang="en-US" smtClean="0"/>
+              <a:rPr lang="en-US"/>
               <a:t>Second level</a:t>
             </a:r>
           </a:p>
           <a:p>
             <a:pPr lvl="2"/>
             <a:r>
-              <a:rPr lang="en-US" smtClean="0"/>
+              <a:rPr lang="en-US"/>
               <a:t>Third level</a:t>
             </a:r>
           </a:p>
           <a:p>
             <a:pPr lvl="3"/>
             <a:r>
-              <a:rPr lang="en-US" smtClean="0"/>
+              <a:rPr lang="en-US"/>
               <a:t>Fourth level</a:t>
             </a:r>
           </a:p>
           <a:p>
             <a:pPr lvl="4"/>
             <a:r>
-              <a:rPr lang="en-US" smtClean="0"/>
+              <a:rPr lang="en-US"/>
               <a:t>Fifth level</a:t>
             </a:r>
             <a:endParaRPr lang="en-US" dirty="0"/>
@@ -593,7 +593,7 @@
           <a:p>
             <a:fld id="{672AD7E1-AA2C-46F3-A94C-00AB04138B09}" type="datetimeFigureOut">
               <a:rPr lang="en-US" smtClean="0"/>
-              <a:t>03/22/15</a:t>
+              <a:t>5/11/2016</a:t>
             </a:fld>
             <a:endParaRPr lang="en-US"/>
           </a:p>
@@ -687,7 +687,7 @@
           <a:lstStyle/>
           <a:p>
             <a:r>
-              <a:rPr lang="en-US" smtClean="0"/>
+              <a:rPr lang="en-US"/>
               <a:t>Click to edit Master title style</a:t>
             </a:r>
             <a:endParaRPr lang="en-US" dirty="0"/>
@@ -711,35 +711,35 @@
           <a:p>
             <a:pPr lvl="0"/>
             <a:r>
-              <a:rPr lang="en-US" smtClean="0"/>
+              <a:rPr lang="en-US"/>
               <a:t>Click to edit Master text styles</a:t>
             </a:r>
           </a:p>
           <a:p>
             <a:pPr lvl="1"/>
             <a:r>
-              <a:rPr lang="en-US" smtClean="0"/>
+              <a:rPr lang="en-US"/>
               <a:t>Second level</a:t>
             </a:r>
           </a:p>
           <a:p>
             <a:pPr lvl="2"/>
             <a:r>
-              <a:rPr lang="en-US" smtClean="0"/>
+              <a:rPr lang="en-US"/>
               <a:t>Third level</a:t>
             </a:r>
           </a:p>
           <a:p>
             <a:pPr lvl="3"/>
             <a:r>
-              <a:rPr lang="en-US" smtClean="0"/>
+              <a:rPr lang="en-US"/>
               <a:t>Fourth level</a:t>
             </a:r>
           </a:p>
           <a:p>
             <a:pPr lvl="4"/>
             <a:r>
-              <a:rPr lang="en-US" smtClean="0"/>
+              <a:rPr lang="en-US"/>
               <a:t>Fifth level</a:t>
             </a:r>
             <a:endParaRPr lang="en-US" dirty="0"/>
@@ -763,7 +763,7 @@
           <a:p>
             <a:fld id="{672AD7E1-AA2C-46F3-A94C-00AB04138B09}" type="datetimeFigureOut">
               <a:rPr lang="en-US" smtClean="0"/>
-              <a:t>03/22/15</a:t>
+              <a:t>5/11/2016</a:t>
             </a:fld>
             <a:endParaRPr lang="en-US"/>
           </a:p>
@@ -866,7 +866,7 @@
           </a:lstStyle>
           <a:p>
             <a:r>
-              <a:rPr lang="en-US" smtClean="0"/>
+              <a:rPr lang="en-US"/>
               <a:t>Click to edit Master title style</a:t>
             </a:r>
             <a:endParaRPr lang="en-US" dirty="0"/>
@@ -986,7 +986,7 @@
           <a:p>
             <a:pPr lvl="0"/>
             <a:r>
-              <a:rPr lang="en-US" smtClean="0"/>
+              <a:rPr lang="en-US"/>
               <a:t>Click to edit Master text styles</a:t>
             </a:r>
           </a:p>
@@ -1009,7 +1009,7 @@
           <a:p>
             <a:fld id="{672AD7E1-AA2C-46F3-A94C-00AB04138B09}" type="datetimeFigureOut">
               <a:rPr lang="en-US" smtClean="0"/>
-              <a:t>03/22/15</a:t>
+              <a:t>5/11/2016</a:t>
             </a:fld>
             <a:endParaRPr lang="en-US"/>
           </a:p>
@@ -1103,7 +1103,7 @@
           <a:lstStyle/>
           <a:p>
             <a:r>
-              <a:rPr lang="en-US" smtClean="0"/>
+              <a:rPr lang="en-US"/>
               <a:t>Click to edit Master title style</a:t>
             </a:r>
             <a:endParaRPr lang="en-US" dirty="0"/>
@@ -1132,35 +1132,35 @@
           <a:p>
             <a:pPr lvl="0"/>
             <a:r>
-              <a:rPr lang="en-US" smtClean="0"/>
+              <a:rPr lang="en-US"/>
               <a:t>Click to edit Master text styles</a:t>
             </a:r>
           </a:p>
           <a:p>
             <a:pPr lvl="1"/>
             <a:r>
-              <a:rPr lang="en-US" smtClean="0"/>
+              <a:rPr lang="en-US"/>
               <a:t>Second level</a:t>
             </a:r>
           </a:p>
           <a:p>
             <a:pPr lvl="2"/>
             <a:r>
-              <a:rPr lang="en-US" smtClean="0"/>
+              <a:rPr lang="en-US"/>
               <a:t>Third level</a:t>
             </a:r>
           </a:p>
           <a:p>
             <a:pPr lvl="3"/>
             <a:r>
-              <a:rPr lang="en-US" smtClean="0"/>
+              <a:rPr lang="en-US"/>
               <a:t>Fourth level</a:t>
             </a:r>
           </a:p>
           <a:p>
             <a:pPr lvl="4"/>
             <a:r>
-              <a:rPr lang="en-US" smtClean="0"/>
+              <a:rPr lang="en-US"/>
               <a:t>Fifth level</a:t>
             </a:r>
             <a:endParaRPr lang="en-US" dirty="0"/>
@@ -1189,35 +1189,35 @@
           <a:p>
             <a:pPr lvl="0"/>
             <a:r>
-              <a:rPr lang="en-US" smtClean="0"/>
+              <a:rPr lang="en-US"/>
               <a:t>Click to edit Master text styles</a:t>
             </a:r>
           </a:p>
           <a:p>
             <a:pPr lvl="1"/>
             <a:r>
-              <a:rPr lang="en-US" smtClean="0"/>
+              <a:rPr lang="en-US"/>
               <a:t>Second level</a:t>
             </a:r>
           </a:p>
           <a:p>
             <a:pPr lvl="2"/>
             <a:r>
-              <a:rPr lang="en-US" smtClean="0"/>
+              <a:rPr lang="en-US"/>
               <a:t>Third level</a:t>
             </a:r>
           </a:p>
           <a:p>
             <a:pPr lvl="3"/>
             <a:r>
-              <a:rPr lang="en-US" smtClean="0"/>
+              <a:rPr lang="en-US"/>
               <a:t>Fourth level</a:t>
             </a:r>
           </a:p>
           <a:p>
             <a:pPr lvl="4"/>
             <a:r>
-              <a:rPr lang="en-US" smtClean="0"/>
+              <a:rPr lang="en-US"/>
               <a:t>Fifth level</a:t>
             </a:r>
             <a:endParaRPr lang="en-US" dirty="0"/>
@@ -1241,7 +1241,7 @@
           <a:p>
             <a:fld id="{672AD7E1-AA2C-46F3-A94C-00AB04138B09}" type="datetimeFigureOut">
               <a:rPr lang="en-US" smtClean="0"/>
-              <a:t>03/22/15</a:t>
+              <a:t>5/11/2016</a:t>
             </a:fld>
             <a:endParaRPr lang="en-US"/>
           </a:p>
@@ -1340,7 +1340,7 @@
           <a:lstStyle/>
           <a:p>
             <a:r>
-              <a:rPr lang="en-US" smtClean="0"/>
+              <a:rPr lang="en-US"/>
               <a:t>Click to edit Master title style</a:t>
             </a:r>
             <a:endParaRPr lang="en-US" dirty="0"/>
@@ -1406,7 +1406,7 @@
           <a:p>
             <a:pPr lvl="0"/>
             <a:r>
-              <a:rPr lang="en-US" smtClean="0"/>
+              <a:rPr lang="en-US"/>
               <a:t>Click to edit Master text styles</a:t>
             </a:r>
           </a:p>
@@ -1434,35 +1434,35 @@
           <a:p>
             <a:pPr lvl="0"/>
             <a:r>
-              <a:rPr lang="en-US" smtClean="0"/>
+              <a:rPr lang="en-US"/>
               <a:t>Click to edit Master text styles</a:t>
             </a:r>
           </a:p>
           <a:p>
             <a:pPr lvl="1"/>
             <a:r>
-              <a:rPr lang="en-US" smtClean="0"/>
+              <a:rPr lang="en-US"/>
               <a:t>Second level</a:t>
             </a:r>
           </a:p>
           <a:p>
             <a:pPr lvl="2"/>
             <a:r>
-              <a:rPr lang="en-US" smtClean="0"/>
+              <a:rPr lang="en-US"/>
               <a:t>Third level</a:t>
             </a:r>
           </a:p>
           <a:p>
             <a:pPr lvl="3"/>
             <a:r>
-              <a:rPr lang="en-US" smtClean="0"/>
+              <a:rPr lang="en-US"/>
               <a:t>Fourth level</a:t>
             </a:r>
           </a:p>
           <a:p>
             <a:pPr lvl="4"/>
             <a:r>
-              <a:rPr lang="en-US" smtClean="0"/>
+              <a:rPr lang="en-US"/>
               <a:t>Fifth level</a:t>
             </a:r>
             <a:endParaRPr lang="en-US" dirty="0"/>
@@ -1528,7 +1528,7 @@
           <a:p>
             <a:pPr lvl="0"/>
             <a:r>
-              <a:rPr lang="en-US" smtClean="0"/>
+              <a:rPr lang="en-US"/>
               <a:t>Click to edit Master text styles</a:t>
             </a:r>
           </a:p>
@@ -1556,35 +1556,35 @@
           <a:p>
             <a:pPr lvl="0"/>
             <a:r>
-              <a:rPr lang="en-US" smtClean="0"/>
+              <a:rPr lang="en-US"/>
               <a:t>Click to edit Master text styles</a:t>
             </a:r>
           </a:p>
           <a:p>
             <a:pPr lvl="1"/>
             <a:r>
-              <a:rPr lang="en-US" smtClean="0"/>
+              <a:rPr lang="en-US"/>
               <a:t>Second level</a:t>
             </a:r>
           </a:p>
           <a:p>
             <a:pPr lvl="2"/>
             <a:r>
-              <a:rPr lang="en-US" smtClean="0"/>
+              <a:rPr lang="en-US"/>
               <a:t>Third level</a:t>
             </a:r>
           </a:p>
           <a:p>
             <a:pPr lvl="3"/>
             <a:r>
-              <a:rPr lang="en-US" smtClean="0"/>
+              <a:rPr lang="en-US"/>
               <a:t>Fourth level</a:t>
             </a:r>
           </a:p>
           <a:p>
             <a:pPr lvl="4"/>
             <a:r>
-              <a:rPr lang="en-US" smtClean="0"/>
+              <a:rPr lang="en-US"/>
               <a:t>Fifth level</a:t>
             </a:r>
             <a:endParaRPr lang="en-US" dirty="0"/>
@@ -1608,7 +1608,7 @@
           <a:p>
             <a:fld id="{672AD7E1-AA2C-46F3-A94C-00AB04138B09}" type="datetimeFigureOut">
               <a:rPr lang="en-US" smtClean="0"/>
-              <a:t>03/22/15</a:t>
+              <a:t>5/11/2016</a:t>
             </a:fld>
             <a:endParaRPr lang="en-US"/>
           </a:p>
@@ -1702,7 +1702,7 @@
           <a:lstStyle/>
           <a:p>
             <a:r>
-              <a:rPr lang="en-US" smtClean="0"/>
+              <a:rPr lang="en-US"/>
               <a:t>Click to edit Master title style</a:t>
             </a:r>
             <a:endParaRPr lang="en-US" dirty="0"/>
@@ -1726,7 +1726,7 @@
           <a:p>
             <a:fld id="{672AD7E1-AA2C-46F3-A94C-00AB04138B09}" type="datetimeFigureOut">
               <a:rPr lang="en-US" smtClean="0"/>
-              <a:t>03/22/15</a:t>
+              <a:t>5/11/2016</a:t>
             </a:fld>
             <a:endParaRPr lang="en-US"/>
           </a:p>
@@ -1821,7 +1821,7 @@
           <a:p>
             <a:fld id="{672AD7E1-AA2C-46F3-A94C-00AB04138B09}" type="datetimeFigureOut">
               <a:rPr lang="en-US" smtClean="0"/>
-              <a:t>03/22/15</a:t>
+              <a:t>5/11/2016</a:t>
             </a:fld>
             <a:endParaRPr lang="en-US"/>
           </a:p>
@@ -1924,7 +1924,7 @@
           </a:lstStyle>
           <a:p>
             <a:r>
-              <a:rPr lang="en-US" smtClean="0"/>
+              <a:rPr lang="en-US"/>
               <a:t>Click to edit Master title style</a:t>
             </a:r>
             <a:endParaRPr lang="en-US" dirty="0"/>
@@ -1981,35 +1981,35 @@
           <a:p>
             <a:pPr lvl="0"/>
             <a:r>
-              <a:rPr lang="en-US" smtClean="0"/>
+              <a:rPr lang="en-US"/>
               <a:t>Click to edit Master text styles</a:t>
             </a:r>
           </a:p>
           <a:p>
             <a:pPr lvl="1"/>
             <a:r>
-              <a:rPr lang="en-US" smtClean="0"/>
+              <a:rPr lang="en-US"/>
               <a:t>Second level</a:t>
             </a:r>
           </a:p>
           <a:p>
             <a:pPr lvl="2"/>
             <a:r>
-              <a:rPr lang="en-US" smtClean="0"/>
+              <a:rPr lang="en-US"/>
               <a:t>Third level</a:t>
             </a:r>
           </a:p>
           <a:p>
             <a:pPr lvl="3"/>
             <a:r>
-              <a:rPr lang="en-US" smtClean="0"/>
+              <a:rPr lang="en-US"/>
               <a:t>Fourth level</a:t>
             </a:r>
           </a:p>
           <a:p>
             <a:pPr lvl="4"/>
             <a:r>
-              <a:rPr lang="en-US" smtClean="0"/>
+              <a:rPr lang="en-US"/>
               <a:t>Fifth level</a:t>
             </a:r>
             <a:endParaRPr lang="en-US" dirty="0"/>
@@ -2075,7 +2075,7 @@
           <a:p>
             <a:pPr lvl="0"/>
             <a:r>
-              <a:rPr lang="en-US" smtClean="0"/>
+              <a:rPr lang="en-US"/>
               <a:t>Click to edit Master text styles</a:t>
             </a:r>
           </a:p>
@@ -2098,7 +2098,7 @@
           <a:p>
             <a:fld id="{672AD7E1-AA2C-46F3-A94C-00AB04138B09}" type="datetimeFigureOut">
               <a:rPr lang="en-US" smtClean="0"/>
-              <a:t>03/22/15</a:t>
+              <a:t>5/11/2016</a:t>
             </a:fld>
             <a:endParaRPr lang="en-US"/>
           </a:p>
@@ -2201,7 +2201,7 @@
           </a:lstStyle>
           <a:p>
             <a:r>
-              <a:rPr lang="en-US" smtClean="0"/>
+              <a:rPr lang="en-US"/>
               <a:t>Click to edit Master title style</a:t>
             </a:r>
             <a:endParaRPr lang="en-US" dirty="0"/>
@@ -2266,7 +2266,7 @@
           </a:lstStyle>
           <a:p>
             <a:r>
-              <a:rPr lang="en-US" smtClean="0"/>
+              <a:rPr lang="en-US"/>
               <a:t>Click icon to add picture</a:t>
             </a:r>
             <a:endParaRPr lang="en-US" dirty="0"/>
@@ -2332,7 +2332,7 @@
           <a:p>
             <a:pPr lvl="0"/>
             <a:r>
-              <a:rPr lang="en-US" smtClean="0"/>
+              <a:rPr lang="en-US"/>
               <a:t>Click to edit Master text styles</a:t>
             </a:r>
           </a:p>
@@ -2355,7 +2355,7 @@
           <a:p>
             <a:fld id="{672AD7E1-AA2C-46F3-A94C-00AB04138B09}" type="datetimeFigureOut">
               <a:rPr lang="en-US" smtClean="0"/>
-              <a:t>03/22/15</a:t>
+              <a:t>5/11/2016</a:t>
             </a:fld>
             <a:endParaRPr lang="en-US"/>
           </a:p>
@@ -2464,7 +2464,7 @@
           <a:lstStyle/>
           <a:p>
             <a:r>
-              <a:rPr lang="en-US" smtClean="0"/>
+              <a:rPr lang="en-US"/>
               <a:t>Click to edit Master title style</a:t>
             </a:r>
             <a:endParaRPr lang="en-US" dirty="0"/>
@@ -2498,35 +2498,35 @@
           <a:p>
             <a:pPr lvl="0"/>
             <a:r>
-              <a:rPr lang="en-US" smtClean="0"/>
+              <a:rPr lang="en-US"/>
               <a:t>Click to edit Master text styles</a:t>
             </a:r>
           </a:p>
           <a:p>
             <a:pPr lvl="1"/>
             <a:r>
-              <a:rPr lang="en-US" smtClean="0"/>
+              <a:rPr lang="en-US"/>
               <a:t>Second level</a:t>
             </a:r>
           </a:p>
           <a:p>
             <a:pPr lvl="2"/>
             <a:r>
-              <a:rPr lang="en-US" smtClean="0"/>
+              <a:rPr lang="en-US"/>
               <a:t>Third level</a:t>
             </a:r>
           </a:p>
           <a:p>
             <a:pPr lvl="3"/>
             <a:r>
-              <a:rPr lang="en-US" smtClean="0"/>
+              <a:rPr lang="en-US"/>
               <a:t>Fourth level</a:t>
             </a:r>
           </a:p>
           <a:p>
             <a:pPr lvl="4"/>
             <a:r>
-              <a:rPr lang="en-US" smtClean="0"/>
+              <a:rPr lang="en-US"/>
               <a:t>Fifth level</a:t>
             </a:r>
             <a:endParaRPr lang="en-US" dirty="0"/>
@@ -2568,7 +2568,7 @@
           <a:p>
             <a:fld id="{672AD7E1-AA2C-46F3-A94C-00AB04138B09}" type="datetimeFigureOut">
               <a:rPr lang="en-US" smtClean="0"/>
-              <a:t>03/22/15</a:t>
+              <a:t>5/11/2016</a:t>
             </a:fld>
             <a:endParaRPr lang="en-US"/>
           </a:p>
@@ -3130,8 +3130,8 @@
           </a:p>
         </p:txBody>
       </p:sp>
-      <mc:AlternateContent xmlns:mc="http://schemas.openxmlformats.org/markup-compatibility/2006">
-        <mc:Choice xmlns:a14="http://schemas.microsoft.com/office/drawing/2010/main" Requires="a14">
+      <mc:AlternateContent xmlns:mc="http://schemas.openxmlformats.org/markup-compatibility/2006" xmlns:a14="http://schemas.microsoft.com/office/drawing/2010/main">
+        <mc:Choice Requires="a14">
           <p:sp>
             <p:nvSpPr>
               <p:cNvPr id="74" name="TextBox 73"/>
@@ -3141,7 +3141,7 @@
             <p:spPr>
               <a:xfrm>
                 <a:off x="2284080" y="4154125"/>
-                <a:ext cx="3211944" cy="1157719"/>
+                <a:ext cx="3211944" cy="1187564"/>
               </a:xfrm>
               <a:prstGeom prst="ellipse">
                 <a:avLst/>
@@ -3173,7 +3173,7 @@
               <a:lstStyle/>
               <a:p>
                 <a:r>
-                  <a:rPr lang="en-US" sz="1750" dirty="0" smtClean="0">
+                  <a:rPr lang="en-US" sz="1750" dirty="0">
                     <a:solidFill>
                       <a:srgbClr val="FF0000"/>
                     </a:solidFill>
@@ -3193,16 +3193,7 @@
                     </a:solidFill>
                     <a:latin typeface="+mj-lt"/>
                   </a:rPr>
-                  <a:t>Descends after </a:t>
-                </a:r>
-                <a:r>
-                  <a:rPr lang="en-US" sz="1500" dirty="0" smtClean="0">
-                    <a:solidFill>
-                      <a:srgbClr val="FF0000"/>
-                    </a:solidFill>
-                    <a:latin typeface="+mj-lt"/>
-                  </a:rPr>
-                  <a:t>a duration of </a:t>
+                  <a:t>Descends after a duration of </a:t>
                 </a:r>
                 <a14:m>
                   <m:oMath xmlns:m="http://schemas.openxmlformats.org/officeDocument/2006/math">
@@ -3239,7 +3230,7 @@
                             </a:solidFill>
                             <a:latin typeface="Cambria Math" panose="02040503050406030204" pitchFamily="18" charset="0"/>
                           </a:rPr>
-                          <m:t>internal</m:t>
+                          <m:t>faulty</m:t>
                         </m:r>
                       </m:sub>
                     </m:sSub>
@@ -3254,7 +3245,7 @@
             </p:txBody>
           </p:sp>
         </mc:Choice>
-        <mc:Fallback>
+        <mc:Fallback xmlns="">
           <p:sp>
             <p:nvSpPr>
               <p:cNvPr id="74" name="TextBox 73"/>
@@ -3266,12 +3257,12 @@
             <p:spPr>
               <a:xfrm>
                 <a:off x="2284080" y="4154125"/>
-                <a:ext cx="3211944" cy="1157719"/>
+                <a:ext cx="3211944" cy="1187564"/>
               </a:xfrm>
               <a:prstGeom prst="ellipse">
                 <a:avLst/>
               </a:prstGeom>
-              <a:blipFill rotWithShape="0">
+              <a:blipFill>
                 <a:blip r:embed="rId2"/>
                 <a:stretch>
                   <a:fillRect/>
@@ -3400,8 +3391,8 @@
         </p:nvSpPr>
         <p:spPr>
           <a:xfrm>
-            <a:off x="6171399" y="1160837"/>
-            <a:ext cx="925864" cy="842538"/>
+            <a:off x="5676614" y="1134454"/>
+            <a:ext cx="1258101" cy="592470"/>
           </a:xfrm>
           <a:prstGeom prst="rect">
             <a:avLst/>
@@ -3661,8 +3652,8 @@
         </p:nvCxnSpPr>
         <p:spPr>
           <a:xfrm rot="5400000">
-            <a:off x="5413723" y="3682080"/>
-            <a:ext cx="1133207" cy="968603"/>
+            <a:off x="5406262" y="3689541"/>
+            <a:ext cx="1148129" cy="968603"/>
           </a:xfrm>
           <a:prstGeom prst="curvedConnector2">
             <a:avLst/>
@@ -3700,8 +3691,8 @@
         </p:nvCxnSpPr>
         <p:spPr>
           <a:xfrm rot="16200000" flipH="1">
-            <a:off x="1233638" y="3682542"/>
-            <a:ext cx="959805" cy="1141080"/>
+            <a:off x="1226177" y="3690003"/>
+            <a:ext cx="974727" cy="1141080"/>
           </a:xfrm>
           <a:prstGeom prst="curvedConnector2">
             <a:avLst/>

</xml_diff>